<commit_message>
Update prsn, v0.1 ready
</commit_message>
<xml_diff>
--- a/Doc/hackathon_prsn.pptx
+++ b/Doc/hackathon_prsn.pptx
@@ -1754,7 +1754,7 @@
           </a:bodyPr>
           <a:p>
             <a:pPr algn="r"/>
-            <a:fld id="{9A94C00E-5C73-44F2-9E51-E6F824F52DDE}" type="slidenum">
+            <a:fld id="{3AF7B791-8885-4B7A-A571-6F43E03FC912}" type="slidenum">
               <a:rPr b="0" lang="en-IN" sz="1400" spc="-1" strike="noStrike">
                 <a:latin typeface="Times New Roman"/>
               </a:rPr>
@@ -1961,7 +1961,7 @@
       </p:grpSpPr>
       <p:sp>
         <p:nvSpPr>
-          <p:cNvPr id="63" name="TextShape 1"/>
+          <p:cNvPr id="71" name="TextShape 1"/>
           <p:cNvSpPr txBox="1"/>
           <p:nvPr/>
         </p:nvSpPr>
@@ -2037,7 +2037,7 @@
         </p:nvSpPr>
         <p:spPr>
           <a:xfrm>
-            <a:off x="504000" y="226080"/>
+            <a:off x="576000" y="226080"/>
             <a:ext cx="9071640" cy="946440"/>
           </a:xfrm>
           <a:prstGeom prst="rect">
@@ -2180,6 +2180,45 @@
               <a:t>AI/ML can help with accessibility, early detection and management of diseases</a:t>
             </a:r>
             <a:endParaRPr b="0" lang="en-IN" sz="3200" spc="-1" strike="noStrike">
+              <a:latin typeface="Arial"/>
+            </a:endParaRPr>
+          </a:p>
+        </p:txBody>
+      </p:sp>
+      <p:sp>
+        <p:nvSpPr>
+          <p:cNvPr id="45" name="TextShape 3"/>
+          <p:cNvSpPr txBox="1"/>
+          <p:nvPr/>
+        </p:nvSpPr>
+        <p:spPr>
+          <a:xfrm rot="16200000">
+            <a:off x="-964800" y="4344840"/>
+            <a:ext cx="2304000" cy="346320"/>
+          </a:xfrm>
+          <a:prstGeom prst="rect">
+            <a:avLst/>
+          </a:prstGeom>
+          <a:noFill/>
+          <a:ln>
+            <a:noFill/>
+          </a:ln>
+        </p:spPr>
+        <p:txBody>
+          <a:bodyPr lIns="90000" rIns="90000" tIns="45000" bIns="45000">
+            <a:noAutofit/>
+          </a:bodyPr>
+          <a:p>
+            <a:r>
+              <a:rPr b="0" lang="en-IN" sz="1800" spc="-1" strike="noStrike">
+                <a:solidFill>
+                  <a:srgbClr val="cccccc"/>
+                </a:solidFill>
+                <a:latin typeface="Arial"/>
+              </a:rPr>
+              <a:t>Team ATR21 Slide 2</a:t>
+            </a:r>
+            <a:endParaRPr b="0" lang="en-IN" sz="1800" spc="-1" strike="noStrike">
               <a:latin typeface="Arial"/>
             </a:endParaRPr>
           </a:p>
@@ -2217,7 +2256,7 @@
       </p:grpSpPr>
       <p:sp>
         <p:nvSpPr>
-          <p:cNvPr id="45" name="TextShape 1"/>
+          <p:cNvPr id="46" name="TextShape 1"/>
           <p:cNvSpPr txBox="1"/>
           <p:nvPr/>
         </p:nvSpPr>
@@ -2260,7 +2299,7 @@
       </p:sp>
       <p:sp>
         <p:nvSpPr>
-          <p:cNvPr id="46" name="TextShape 2"/>
+          <p:cNvPr id="47" name="TextShape 2"/>
           <p:cNvSpPr txBox="1"/>
           <p:nvPr/>
         </p:nvSpPr>
@@ -2366,6 +2405,45 @@
               <a:t>Webapp designed to assist user and help with early disease detection</a:t>
             </a:r>
             <a:endParaRPr b="0" lang="en-IN" sz="3200" spc="-1" strike="noStrike">
+              <a:latin typeface="Arial"/>
+            </a:endParaRPr>
+          </a:p>
+        </p:txBody>
+      </p:sp>
+      <p:sp>
+        <p:nvSpPr>
+          <p:cNvPr id="48" name="TextShape 3"/>
+          <p:cNvSpPr txBox="1"/>
+          <p:nvPr/>
+        </p:nvSpPr>
+        <p:spPr>
+          <a:xfrm rot="16200000">
+            <a:off x="-964800" y="4344840"/>
+            <a:ext cx="2304000" cy="346320"/>
+          </a:xfrm>
+          <a:prstGeom prst="rect">
+            <a:avLst/>
+          </a:prstGeom>
+          <a:noFill/>
+          <a:ln>
+            <a:noFill/>
+          </a:ln>
+        </p:spPr>
+        <p:txBody>
+          <a:bodyPr lIns="90000" rIns="90000" tIns="45000" bIns="45000">
+            <a:noAutofit/>
+          </a:bodyPr>
+          <a:p>
+            <a:r>
+              <a:rPr b="0" lang="en-IN" sz="1800" spc="-1" strike="noStrike">
+                <a:solidFill>
+                  <a:srgbClr val="cccccc"/>
+                </a:solidFill>
+                <a:latin typeface="Arial"/>
+              </a:rPr>
+              <a:t>Team ATR21 Slide 3</a:t>
+            </a:r>
+            <a:endParaRPr b="0" lang="en-IN" sz="1800" spc="-1" strike="noStrike">
               <a:latin typeface="Arial"/>
             </a:endParaRPr>
           </a:p>
@@ -2403,13 +2481,13 @@
       </p:grpSpPr>
       <p:sp>
         <p:nvSpPr>
-          <p:cNvPr id="47" name="TextShape 1"/>
+          <p:cNvPr id="49" name="TextShape 1"/>
           <p:cNvSpPr txBox="1"/>
           <p:nvPr/>
         </p:nvSpPr>
         <p:spPr>
           <a:xfrm>
-            <a:off x="504000" y="226080"/>
+            <a:off x="576000" y="205560"/>
             <a:ext cx="9071640" cy="946440"/>
           </a:xfrm>
           <a:prstGeom prst="rect">
@@ -2446,7 +2524,7 @@
       </p:sp>
       <p:sp>
         <p:nvSpPr>
-          <p:cNvPr id="48" name="TextShape 2"/>
+          <p:cNvPr id="50" name="TextShape 2"/>
           <p:cNvSpPr txBox="1"/>
           <p:nvPr/>
         </p:nvSpPr>
@@ -2546,6 +2624,45 @@
               <a:buChar char=""/>
             </a:pPr>
             <a:endParaRPr b="0" lang="en-IN" sz="3200" spc="-1" strike="noStrike">
+              <a:latin typeface="Arial"/>
+            </a:endParaRPr>
+          </a:p>
+        </p:txBody>
+      </p:sp>
+      <p:sp>
+        <p:nvSpPr>
+          <p:cNvPr id="51" name="TextShape 3"/>
+          <p:cNvSpPr txBox="1"/>
+          <p:nvPr/>
+        </p:nvSpPr>
+        <p:spPr>
+          <a:xfrm rot="16200000">
+            <a:off x="-964800" y="4344840"/>
+            <a:ext cx="2304000" cy="346320"/>
+          </a:xfrm>
+          <a:prstGeom prst="rect">
+            <a:avLst/>
+          </a:prstGeom>
+          <a:noFill/>
+          <a:ln>
+            <a:noFill/>
+          </a:ln>
+        </p:spPr>
+        <p:txBody>
+          <a:bodyPr lIns="90000" rIns="90000" tIns="45000" bIns="45000">
+            <a:noAutofit/>
+          </a:bodyPr>
+          <a:p>
+            <a:r>
+              <a:rPr b="0" lang="en-IN" sz="1800" spc="-1" strike="noStrike">
+                <a:solidFill>
+                  <a:srgbClr val="cccccc"/>
+                </a:solidFill>
+                <a:latin typeface="Arial"/>
+              </a:rPr>
+              <a:t>Team ATR21 Slide 4</a:t>
+            </a:r>
+            <a:endParaRPr b="0" lang="en-IN" sz="1800" spc="-1" strike="noStrike">
               <a:latin typeface="Arial"/>
             </a:endParaRPr>
           </a:p>
@@ -2583,7 +2700,7 @@
       </p:grpSpPr>
       <p:sp>
         <p:nvSpPr>
-          <p:cNvPr id="49" name="TextShape 1"/>
+          <p:cNvPr id="52" name="TextShape 1"/>
           <p:cNvSpPr txBox="1"/>
           <p:nvPr/>
         </p:nvSpPr>
@@ -2626,7 +2743,7 @@
       </p:sp>
       <p:sp>
         <p:nvSpPr>
-          <p:cNvPr id="50" name="TextShape 2"/>
+          <p:cNvPr id="53" name="TextShape 2"/>
           <p:cNvSpPr txBox="1"/>
           <p:nvPr/>
         </p:nvSpPr>
@@ -2761,7 +2878,7 @@
       </p:sp>
       <p:pic>
         <p:nvPicPr>
-          <p:cNvPr id="51" name="" descr=""/>
+          <p:cNvPr id="54" name="" descr=""/>
           <p:cNvPicPr/>
           <p:nvPr/>
         </p:nvPicPr>
@@ -2784,7 +2901,7 @@
       </p:pic>
       <p:pic>
         <p:nvPicPr>
-          <p:cNvPr id="52" name="" descr=""/>
+          <p:cNvPr id="55" name="" descr=""/>
           <p:cNvPicPr/>
           <p:nvPr/>
         </p:nvPicPr>
@@ -2805,6 +2922,45 @@
           </a:ln>
         </p:spPr>
       </p:pic>
+      <p:sp>
+        <p:nvSpPr>
+          <p:cNvPr id="56" name="TextShape 3"/>
+          <p:cNvSpPr txBox="1"/>
+          <p:nvPr/>
+        </p:nvSpPr>
+        <p:spPr>
+          <a:xfrm rot="16200000">
+            <a:off x="-964800" y="4344840"/>
+            <a:ext cx="2304000" cy="346320"/>
+          </a:xfrm>
+          <a:prstGeom prst="rect">
+            <a:avLst/>
+          </a:prstGeom>
+          <a:noFill/>
+          <a:ln>
+            <a:noFill/>
+          </a:ln>
+        </p:spPr>
+        <p:txBody>
+          <a:bodyPr lIns="90000" rIns="90000" tIns="45000" bIns="45000">
+            <a:noAutofit/>
+          </a:bodyPr>
+          <a:p>
+            <a:r>
+              <a:rPr b="0" lang="en-IN" sz="1800" spc="-1" strike="noStrike">
+                <a:solidFill>
+                  <a:srgbClr val="cccccc"/>
+                </a:solidFill>
+                <a:latin typeface="Arial"/>
+              </a:rPr>
+              <a:t>Team ATR21 Slide 5</a:t>
+            </a:r>
+            <a:endParaRPr b="0" lang="en-IN" sz="1800" spc="-1" strike="noStrike">
+              <a:latin typeface="Arial"/>
+            </a:endParaRPr>
+          </a:p>
+        </p:txBody>
+      </p:sp>
     </p:spTree>
   </p:cSld>
   <mc:AlternateContent>
@@ -2837,7 +2993,7 @@
       </p:grpSpPr>
       <p:sp>
         <p:nvSpPr>
-          <p:cNvPr id="53" name="TextShape 1"/>
+          <p:cNvPr id="57" name="TextShape 1"/>
           <p:cNvSpPr txBox="1"/>
           <p:nvPr/>
         </p:nvSpPr>
@@ -2880,7 +3036,7 @@
       </p:sp>
       <p:sp>
         <p:nvSpPr>
-          <p:cNvPr id="54" name="TextShape 2"/>
+          <p:cNvPr id="58" name="TextShape 2"/>
           <p:cNvSpPr txBox="1"/>
           <p:nvPr/>
         </p:nvSpPr>
@@ -2993,7 +3149,7 @@
       </p:sp>
       <p:pic>
         <p:nvPicPr>
-          <p:cNvPr id="55" name="" descr=""/>
+          <p:cNvPr id="59" name="" descr=""/>
           <p:cNvPicPr/>
           <p:nvPr/>
         </p:nvPicPr>
@@ -3016,7 +3172,7 @@
       </p:pic>
       <p:pic>
         <p:nvPicPr>
-          <p:cNvPr id="56" name="" descr=""/>
+          <p:cNvPr id="60" name="" descr=""/>
           <p:cNvPicPr/>
           <p:nvPr/>
         </p:nvPicPr>
@@ -3037,6 +3193,45 @@
           </a:ln>
         </p:spPr>
       </p:pic>
+      <p:sp>
+        <p:nvSpPr>
+          <p:cNvPr id="61" name="TextShape 3"/>
+          <p:cNvSpPr txBox="1"/>
+          <p:nvPr/>
+        </p:nvSpPr>
+        <p:spPr>
+          <a:xfrm rot="16200000">
+            <a:off x="-964800" y="4344840"/>
+            <a:ext cx="2304000" cy="346320"/>
+          </a:xfrm>
+          <a:prstGeom prst="rect">
+            <a:avLst/>
+          </a:prstGeom>
+          <a:noFill/>
+          <a:ln>
+            <a:noFill/>
+          </a:ln>
+        </p:spPr>
+        <p:txBody>
+          <a:bodyPr lIns="90000" rIns="90000" tIns="45000" bIns="45000">
+            <a:noAutofit/>
+          </a:bodyPr>
+          <a:p>
+            <a:r>
+              <a:rPr b="0" lang="en-IN" sz="1800" spc="-1" strike="noStrike">
+                <a:solidFill>
+                  <a:srgbClr val="cccccc"/>
+                </a:solidFill>
+                <a:latin typeface="Arial"/>
+              </a:rPr>
+              <a:t>Team ATR21 Slide 6</a:t>
+            </a:r>
+            <a:endParaRPr b="0" lang="en-IN" sz="1800" spc="-1" strike="noStrike">
+              <a:latin typeface="Arial"/>
+            </a:endParaRPr>
+          </a:p>
+        </p:txBody>
+      </p:sp>
     </p:spTree>
   </p:cSld>
   <mc:AlternateContent>
@@ -3069,7 +3264,7 @@
       </p:grpSpPr>
       <p:sp>
         <p:nvSpPr>
-          <p:cNvPr id="57" name="TextShape 1"/>
+          <p:cNvPr id="62" name="TextShape 1"/>
           <p:cNvSpPr txBox="1"/>
           <p:nvPr/>
         </p:nvSpPr>
@@ -3112,7 +3307,7 @@
       </p:sp>
       <p:sp>
         <p:nvSpPr>
-          <p:cNvPr id="58" name="TextShape 2"/>
+          <p:cNvPr id="63" name="TextShape 2"/>
           <p:cNvSpPr txBox="1"/>
           <p:nvPr/>
         </p:nvSpPr>
@@ -3212,6 +3407,45 @@
               <a:buChar char=""/>
             </a:pPr>
             <a:endParaRPr b="0" lang="en-IN" sz="3200" spc="-1" strike="noStrike">
+              <a:latin typeface="Arial"/>
+            </a:endParaRPr>
+          </a:p>
+        </p:txBody>
+      </p:sp>
+      <p:sp>
+        <p:nvSpPr>
+          <p:cNvPr id="64" name="TextShape 3"/>
+          <p:cNvSpPr txBox="1"/>
+          <p:nvPr/>
+        </p:nvSpPr>
+        <p:spPr>
+          <a:xfrm rot="16200000">
+            <a:off x="-964800" y="4344840"/>
+            <a:ext cx="2304000" cy="346320"/>
+          </a:xfrm>
+          <a:prstGeom prst="rect">
+            <a:avLst/>
+          </a:prstGeom>
+          <a:noFill/>
+          <a:ln>
+            <a:noFill/>
+          </a:ln>
+        </p:spPr>
+        <p:txBody>
+          <a:bodyPr lIns="90000" rIns="90000" tIns="45000" bIns="45000">
+            <a:noAutofit/>
+          </a:bodyPr>
+          <a:p>
+            <a:r>
+              <a:rPr b="0" lang="en-IN" sz="1800" spc="-1" strike="noStrike">
+                <a:solidFill>
+                  <a:srgbClr val="cccccc"/>
+                </a:solidFill>
+                <a:latin typeface="Arial"/>
+              </a:rPr>
+              <a:t>Team ATR21 Slide 7</a:t>
+            </a:r>
+            <a:endParaRPr b="0" lang="en-IN" sz="1800" spc="-1" strike="noStrike">
               <a:latin typeface="Arial"/>
             </a:endParaRPr>
           </a:p>
@@ -3249,7 +3483,7 @@
       </p:grpSpPr>
       <p:sp>
         <p:nvSpPr>
-          <p:cNvPr id="59" name="TextShape 1"/>
+          <p:cNvPr id="65" name="TextShape 1"/>
           <p:cNvSpPr txBox="1"/>
           <p:nvPr/>
         </p:nvSpPr>
@@ -3292,7 +3526,7 @@
       </p:sp>
       <p:sp>
         <p:nvSpPr>
-          <p:cNvPr id="60" name="TextShape 2"/>
+          <p:cNvPr id="66" name="TextShape 2"/>
           <p:cNvSpPr txBox="1"/>
           <p:nvPr/>
         </p:nvSpPr>
@@ -3398,6 +3632,45 @@
               <a:t>Developed on Ubuntu 20.04</a:t>
             </a:r>
             <a:endParaRPr b="0" lang="en-IN" sz="3200" spc="-1" strike="noStrike">
+              <a:latin typeface="Arial"/>
+            </a:endParaRPr>
+          </a:p>
+        </p:txBody>
+      </p:sp>
+      <p:sp>
+        <p:nvSpPr>
+          <p:cNvPr id="67" name="TextShape 3"/>
+          <p:cNvSpPr txBox="1"/>
+          <p:nvPr/>
+        </p:nvSpPr>
+        <p:spPr>
+          <a:xfrm rot="16200000">
+            <a:off x="-964800" y="4344840"/>
+            <a:ext cx="2304000" cy="346320"/>
+          </a:xfrm>
+          <a:prstGeom prst="rect">
+            <a:avLst/>
+          </a:prstGeom>
+          <a:noFill/>
+          <a:ln>
+            <a:noFill/>
+          </a:ln>
+        </p:spPr>
+        <p:txBody>
+          <a:bodyPr lIns="90000" rIns="90000" tIns="45000" bIns="45000">
+            <a:noAutofit/>
+          </a:bodyPr>
+          <a:p>
+            <a:r>
+              <a:rPr b="0" lang="en-IN" sz="1800" spc="-1" strike="noStrike">
+                <a:solidFill>
+                  <a:srgbClr val="cccccc"/>
+                </a:solidFill>
+                <a:latin typeface="Arial"/>
+              </a:rPr>
+              <a:t>Team ATR21 Slide 8</a:t>
+            </a:r>
+            <a:endParaRPr b="0" lang="en-IN" sz="1800" spc="-1" strike="noStrike">
               <a:latin typeface="Arial"/>
             </a:endParaRPr>
           </a:p>
@@ -3435,7 +3708,7 @@
       </p:grpSpPr>
       <p:sp>
         <p:nvSpPr>
-          <p:cNvPr id="61" name="TextShape 1"/>
+          <p:cNvPr id="68" name="TextShape 1"/>
           <p:cNvSpPr txBox="1"/>
           <p:nvPr/>
         </p:nvSpPr>
@@ -3478,7 +3751,7 @@
       </p:sp>
       <p:sp>
         <p:nvSpPr>
-          <p:cNvPr id="62" name="TextShape 2"/>
+          <p:cNvPr id="69" name="TextShape 2"/>
           <p:cNvSpPr txBox="1"/>
           <p:nvPr/>
         </p:nvSpPr>
@@ -3573,6 +3846,45 @@
               <a:t>Opportunity for low cost, ubiquitous access to a healthcare app(all you need is a web browser)</a:t>
             </a:r>
             <a:endParaRPr b="0" lang="en-IN" sz="3200" spc="-1" strike="noStrike">
+              <a:latin typeface="Arial"/>
+            </a:endParaRPr>
+          </a:p>
+        </p:txBody>
+      </p:sp>
+      <p:sp>
+        <p:nvSpPr>
+          <p:cNvPr id="70" name="TextShape 3"/>
+          <p:cNvSpPr txBox="1"/>
+          <p:nvPr/>
+        </p:nvSpPr>
+        <p:spPr>
+          <a:xfrm rot="16200000">
+            <a:off x="-964800" y="4344840"/>
+            <a:ext cx="2304000" cy="346320"/>
+          </a:xfrm>
+          <a:prstGeom prst="rect">
+            <a:avLst/>
+          </a:prstGeom>
+          <a:noFill/>
+          <a:ln>
+            <a:noFill/>
+          </a:ln>
+        </p:spPr>
+        <p:txBody>
+          <a:bodyPr lIns="90000" rIns="90000" tIns="45000" bIns="45000">
+            <a:noAutofit/>
+          </a:bodyPr>
+          <a:p>
+            <a:r>
+              <a:rPr b="0" lang="en-IN" sz="1800" spc="-1" strike="noStrike">
+                <a:solidFill>
+                  <a:srgbClr val="cccccc"/>
+                </a:solidFill>
+                <a:latin typeface="Arial"/>
+              </a:rPr>
+              <a:t>Team ATR21 Slide 9</a:t>
+            </a:r>
+            <a:endParaRPr b="0" lang="en-IN" sz="1800" spc="-1" strike="noStrike">
               <a:latin typeface="Arial"/>
             </a:endParaRPr>
           </a:p>

</xml_diff>